<commit_message>
oline planning part 1
</commit_message>
<xml_diff>
--- a/week_04/Arbitrage By Pairs Trading.pptx
+++ b/week_04/Arbitrage By Pairs Trading.pptx
@@ -4224,8 +4224,32 @@
         </p:blipFill>
         <p:spPr>
           <a:xfrm>
-            <a:off x="4732655" y="582930"/>
+            <a:off x="3091815" y="582930"/>
             <a:ext cx="3152140" cy="5849620"/>
+          </a:xfrm>
+          <a:prstGeom prst="rect">
+            <a:avLst/>
+          </a:prstGeom>
+        </p:spPr>
+      </p:pic>
+      <p:pic>
+        <p:nvPicPr>
+          <p:cNvPr id="3" name="Picture 2" descr="inv_heatmap"/>
+          <p:cNvPicPr>
+            <a:picLocks noChangeAspect="1"/>
+          </p:cNvPicPr>
+          <p:nvPr/>
+        </p:nvPicPr>
+        <p:blipFill>
+          <a:blip r:embed="rId2"/>
+          <a:stretch>
+            <a:fillRect/>
+          </a:stretch>
+        </p:blipFill>
+        <p:spPr>
+          <a:xfrm>
+            <a:off x="6328410" y="1739900"/>
+            <a:ext cx="5608320" cy="3378835"/>
           </a:xfrm>
           <a:prstGeom prst="rect">
             <a:avLst/>

</xml_diff>